<commit_message>
se agrega imagen actualizada de la arquitectura
</commit_message>
<xml_diff>
--- a/documentos/entregables/Arquitectura-semana1.pptx
+++ b/documentos/entregables/Arquitectura-semana1.pptx
@@ -246,7 +246,7 @@
               <a:rPr lang="en-US" smtClean="0">
                 <a:latin typeface="Segoe UI" pitchFamily="34" charset="0"/>
               </a:rPr>
-              <a:t>12/26/2020</a:t>
+              <a:t>1/9/2021</a:t>
             </a:fld>
             <a:endParaRPr lang="en-US" dirty="0">
               <a:latin typeface="Segoe UI" pitchFamily="34" charset="0"/>
@@ -508,7 +508,7 @@
           <a:p>
             <a:fld id="{E74353ED-ACB2-44BF-A903-985B0AF962B7}" type="datetime1">
               <a:rPr lang="en-US" smtClean="0"/>
-              <a:t>12/26/2020</a:t>
+              <a:t>1/9/2021</a:t>
             </a:fld>
             <a:endParaRPr lang="en-US" dirty="0"/>
           </a:p>
@@ -872,7 +872,7 @@
           <a:p>
             <a:fld id="{E74353ED-ACB2-44BF-A903-985B0AF962B7}" type="datetime1">
               <a:rPr lang="en-US" smtClean="0"/>
-              <a:t>12/26/2020</a:t>
+              <a:t>1/9/2021</a:t>
             </a:fld>
             <a:endParaRPr lang="en-US" dirty="0"/>
           </a:p>
@@ -1034,7 +1034,7 @@
           <a:p>
             <a:fld id="{E74353ED-ACB2-44BF-A903-985B0AF962B7}" type="datetime1">
               <a:rPr lang="en-US" smtClean="0"/>
-              <a:t>12/26/2020</a:t>
+              <a:t>1/9/2021</a:t>
             </a:fld>
             <a:endParaRPr lang="en-US" dirty="0"/>
           </a:p>
@@ -1237,7 +1237,7 @@
           <a:p>
             <a:fld id="{6DCB8B13-F54A-4625-AF12-F2357174F504}" type="datetime1">
               <a:rPr lang="en-US" smtClean="0"/>
-              <a:t>12/26/2020</a:t>
+              <a:t>1/9/2021</a:t>
             </a:fld>
             <a:endParaRPr lang="en-US" dirty="0"/>
           </a:p>
@@ -1356,7 +1356,7 @@
                   <a:prstClr val="black"/>
                 </a:solidFill>
               </a:rPr>
-              <a:t>12/26/2020</a:t>
+              <a:t>1/9/2021</a:t>
             </a:fld>
             <a:endParaRPr lang="en-US" dirty="0">
               <a:solidFill>
@@ -5336,7 +5336,7 @@
           <a:p>
             <a:fld id="{43C0CA2A-A3B8-470C-B399-BD7C3BF658A5}" type="datetime1">
               <a:rPr lang="en-US" smtClean="0"/>
-              <a:t>12/26/2020</a:t>
+              <a:t>1/9/2021</a:t>
             </a:fld>
             <a:endParaRPr lang="en-US"/>
           </a:p>
@@ -5523,7 +5523,7 @@
                 </a:solidFill>
               </a:rPr>
               <a:pPr/>
-              <a:t>12/26/2020</a:t>
+              <a:t>1/9/2021</a:t>
             </a:fld>
             <a:endParaRPr lang="en-US" dirty="0">
               <a:solidFill>
@@ -8377,10 +8377,10 @@
       </p:pic>
       <p:pic>
         <p:nvPicPr>
-          <p:cNvPr id="4" name="Imagen 3" descr="Interfaz de usuario gráfica, Aplicación&#10;&#10;Descripción generada automáticamente">
+          <p:cNvPr id="3" name="Imagen 2" descr="Interfaz de usuario gráfica, Aplicación&#10;&#10;Descripción generada automáticamente">
             <a:extLst>
               <a:ext uri="{FF2B5EF4-FFF2-40B4-BE49-F238E27FC236}">
-                <a16:creationId xmlns:a16="http://schemas.microsoft.com/office/drawing/2014/main" id="{F7E9EF6D-28AC-4092-B380-2237D5E97921}"/>
+                <a16:creationId xmlns:a16="http://schemas.microsoft.com/office/drawing/2014/main" id="{8EEA2378-74E1-4B75-AF2A-BAE234BF1F01}"/>
               </a:ext>
             </a:extLst>
           </p:cNvPr>
@@ -8397,8 +8397,8 @@
         </p:blipFill>
         <p:spPr>
           <a:xfrm>
-            <a:off x="371889" y="558497"/>
-            <a:ext cx="10549575" cy="4613319"/>
+            <a:off x="601613" y="1048990"/>
+            <a:ext cx="10449054" cy="4569361"/>
           </a:xfrm>
           <a:prstGeom prst="rect">
             <a:avLst/>
@@ -9632,107 +9632,6 @@
 </file>
 
 <file path=customXml/item1.xml><?xml version="1.0" encoding="utf-8"?>
-<?mso-contentType ?>
-<FormTemplates xmlns="http://schemas.microsoft.com/sharepoint/v3/contenttype/forms">
-  <Display>DocumentLibraryForm</Display>
-  <Edit>DocumentLibraryForm</Edit>
-  <New>DocumentLibraryForm</New>
-</FormTemplates>
-</file>
-
-<file path=customXml/item2.xml><?xml version="1.0" encoding="utf-8"?>
-<p:properties xmlns:p="http://schemas.microsoft.com/office/2006/metadata/properties" xmlns:xsi="http://www.w3.org/2001/XMLSchema-instance" xmlns:pc="http://schemas.microsoft.com/office/infopath/2007/PartnerControls">
-  <documentManagement>
-    <TaxCatchAll xmlns="230e9df3-be65-4c73-a93b-d1236ebd677e">
-      <Value>9</Value>
-      <Value>18</Value>
-      <Value>17</Value>
-      <Value>16</Value>
-    </TaxCatchAll>
-    <Event_x0020_End_x0020_Date xmlns="e36bfbf9-5e42-489c-a259-4c54eb22cb57">2014-05-15T07:00:00+00:00</Event_x0020_End_x0020_Date>
-    <Event_x0020_Start_x0020_Date xmlns="e36bfbf9-5e42-489c-a259-4c54eb22cb57">2014-05-12T07:00:00+00:00</Event_x0020_Start_x0020_Date>
-    <MS_x0020_Speaker xmlns="e36bfbf9-5e42-489c-a259-4c54eb22cb57">
-      <UserInfo>
-        <DisplayName/>
-        <AccountId xsi:nil="true"/>
-        <AccountType/>
-      </UserInfo>
-    </MS_x0020_Speaker>
-    <External_x0020_Speaker xmlns="e36bfbf9-5e42-489c-a259-4c54eb22cb57"> Andy Wigley</External_x0020_Speaker>
-    <Session_x0020_Code xmlns="e36bfbf9-5e42-489c-a259-4c54eb22cb57">WIN-B363</Session_x0020_Code>
-    <Presentation_x0020_Date xmlns="e36bfbf9-5e42-489c-a259-4c54eb22cb57">2014-05-13T18:00:00-05:00</Presentation_x0020_Date>
-    <MS_x0020_Content_x0020_Owner xmlns="e36bfbf9-5e42-489c-a259-4c54eb22cb57">
-      <UserInfo>
-        <DisplayName/>
-        <AccountId xsi:nil="true"/>
-        <AccountType/>
-      </UserInfo>
-    </MS_x0020_Content_x0020_Owner>
-    <o359a72c0e394a2bbc3ef6c803acc180 xmlns="e36bfbf9-5e42-489c-a259-4c54eb22cb57">
-      <Terms xmlns="http://schemas.microsoft.com/office/infopath/2007/PartnerControls">
-        <TermInfo xmlns="http://schemas.microsoft.com/office/infopath/2007/PartnerControls">
-          <TermName xmlns="http://schemas.microsoft.com/office/infopath/2007/PartnerControls">George R. Brown Convention Center</TermName>
-          <TermId xmlns="http://schemas.microsoft.com/office/infopath/2007/PartnerControls">6c33c07d-d6c4-4c5e-b5d0-7afd8a7a4e7d</TermId>
-        </TermInfo>
-      </Terms>
-    </o359a72c0e394a2bbc3ef6c803acc180>
-    <o05f84fa51b8493184c53e88c1048d4a xmlns="e36bfbf9-5e42-489c-a259-4c54eb22cb57">
-      <Terms xmlns="http://schemas.microsoft.com/office/infopath/2007/PartnerControls"/>
-    </o05f84fa51b8493184c53e88c1048d4a>
-    <g9dd8d57dc62470db6c80d9bb76f6f98 xmlns="e36bfbf9-5e42-489c-a259-4c54eb22cb57">
-      <Terms xmlns="http://schemas.microsoft.com/office/infopath/2007/PartnerControls"/>
-    </g9dd8d57dc62470db6c80d9bb76f6f98>
-    <ha6fe286c6b34f98b7bef39f1ccb86a0 xmlns="e36bfbf9-5e42-489c-a259-4c54eb22cb57">
-      <Terms xmlns="http://schemas.microsoft.com/office/infopath/2007/PartnerControls"/>
-    </ha6fe286c6b34f98b7bef39f1ccb86a0>
-    <o915802bd8fb417bbe5f6f423fd076a0 xmlns="e36bfbf9-5e42-489c-a259-4c54eb22cb57">
-      <Terms xmlns="http://schemas.microsoft.com/office/infopath/2007/PartnerControls">
-        <TermInfo xmlns="http://schemas.microsoft.com/office/infopath/2007/PartnerControls">
-          <TermName xmlns="http://schemas.microsoft.com/office/infopath/2007/PartnerControls">developers</TermName>
-          <TermId xmlns="http://schemas.microsoft.com/office/infopath/2007/PartnerControls">8e4a08dc-5d95-4156-ab65-f22579a1592a</TermId>
-        </TermInfo>
-      </Terms>
-    </o915802bd8fb417bbe5f6f423fd076a0>
-    <i23d7ba649194ae1bace8707520bbe5b xmlns="e36bfbf9-5e42-489c-a259-4c54eb22cb57">
-      <Terms xmlns="http://schemas.microsoft.com/office/infopath/2007/PartnerControls">
-        <TermInfo xmlns="http://schemas.microsoft.com/office/infopath/2007/PartnerControls">
-          <TermName xmlns="http://schemas.microsoft.com/office/infopath/2007/PartnerControls">Microsoft Tech Ed</TermName>
-          <TermId xmlns="http://schemas.microsoft.com/office/infopath/2007/PartnerControls">30c8c6b6-2916-412b-8e18-b132d138380c</TermId>
-        </TermInfo>
-      </Terms>
-    </i23d7ba649194ae1bace8707520bbe5b>
-    <l3c4e8b902d24cac82560b32d42c7cb4 xmlns="e36bfbf9-5e42-489c-a259-4c54eb22cb57">
-      <Terms xmlns="http://schemas.microsoft.com/office/infopath/2007/PartnerControls">
-        <TermInfo xmlns="http://schemas.microsoft.com/office/infopath/2007/PartnerControls">
-          <TermName xmlns="http://schemas.microsoft.com/office/infopath/2007/PartnerControls">Houston</TermName>
-          <TermId xmlns="http://schemas.microsoft.com/office/infopath/2007/PartnerControls">b97448fd-4b6d-4055-9328-60bf1c4ceb26</TermId>
-        </TermInfo>
-      </Terms>
-    </l3c4e8b902d24cac82560b32d42c7cb4>
-    <LikesCount xmlns="http://schemas.microsoft.com/sharepoint/v3" xsi:nil="true"/>
-    <Ratings xmlns="http://schemas.microsoft.com/sharepoint/v3" xsi:nil="true"/>
-    <LikedBy xmlns="http://schemas.microsoft.com/sharepoint/v3">
-      <UserInfo>
-        <DisplayName/>
-        <AccountId xsi:nil="true"/>
-        <AccountType/>
-      </UserInfo>
-    </LikedBy>
-    <TaxKeywordTaxHTField xmlns="230e9df3-be65-4c73-a93b-d1236ebd677e">
-      <Terms xmlns="http://schemas.microsoft.com/office/infopath/2007/PartnerControls"/>
-    </TaxKeywordTaxHTField>
-    <RatedBy xmlns="http://schemas.microsoft.com/sharepoint/v3">
-      <UserInfo>
-        <DisplayName/>
-        <AccountId xsi:nil="true"/>
-        <AccountType/>
-      </UserInfo>
-    </RatedBy>
-  </documentManagement>
-</p:properties>
-</file>
-
-<file path=customXml/item3.xml><?xml version="1.0" encoding="utf-8"?>
 <ct:contentTypeSchema xmlns:ct="http://schemas.microsoft.com/office/2006/metadata/contentType" xmlns:ma="http://schemas.microsoft.com/office/2006/metadata/properties/metaAttributes" ct:_="" ma:_="" ma:contentTypeName="PresentationsDoc" ma:contentTypeID="0x010100CBE8A0D253ED1A4AAAE93FF9B973EB7E0027C1F5D9CEFE6046B3BCA4D310D11AA7" ma:contentTypeVersion="24" ma:contentTypeDescription="" ma:contentTypeScope="" ma:versionID="efeefb7694abe0c79a474bd3a2625cb2">
   <xsd:schema xmlns:xsd="http://www.w3.org/2001/XMLSchema" xmlns:xs="http://www.w3.org/2001/XMLSchema" xmlns:p="http://schemas.microsoft.com/office/2006/metadata/properties" xmlns:ns1="http://schemas.microsoft.com/sharepoint/v3" xmlns:ns2="e36bfbf9-5e42-489c-a259-4c54eb22cb57" xmlns:ns3="230e9df3-be65-4c73-a93b-d1236ebd677e" targetNamespace="http://schemas.microsoft.com/office/2006/metadata/properties" ma:root="true" ma:fieldsID="fd7b0a58d9cd620cb6d262cd5cbd3c93" ns1:_="" ns2:_="" ns3:_="">
     <xsd:import namespace="http://schemas.microsoft.com/sharepoint/v3"/>
@@ -10108,10 +10007,123 @@
 </ct:contentTypeSchema>
 </file>
 
+<file path=customXml/item2.xml><?xml version="1.0" encoding="utf-8"?>
+<p:properties xmlns:p="http://schemas.microsoft.com/office/2006/metadata/properties" xmlns:xsi="http://www.w3.org/2001/XMLSchema-instance" xmlns:pc="http://schemas.microsoft.com/office/infopath/2007/PartnerControls">
+  <documentManagement>
+    <TaxCatchAll xmlns="230e9df3-be65-4c73-a93b-d1236ebd677e">
+      <Value>9</Value>
+      <Value>18</Value>
+      <Value>17</Value>
+      <Value>16</Value>
+    </TaxCatchAll>
+    <Event_x0020_End_x0020_Date xmlns="e36bfbf9-5e42-489c-a259-4c54eb22cb57">2014-05-15T07:00:00+00:00</Event_x0020_End_x0020_Date>
+    <Event_x0020_Start_x0020_Date xmlns="e36bfbf9-5e42-489c-a259-4c54eb22cb57">2014-05-12T07:00:00+00:00</Event_x0020_Start_x0020_Date>
+    <MS_x0020_Speaker xmlns="e36bfbf9-5e42-489c-a259-4c54eb22cb57">
+      <UserInfo>
+        <DisplayName/>
+        <AccountId xsi:nil="true"/>
+        <AccountType/>
+      </UserInfo>
+    </MS_x0020_Speaker>
+    <External_x0020_Speaker xmlns="e36bfbf9-5e42-489c-a259-4c54eb22cb57"> Andy Wigley</External_x0020_Speaker>
+    <Session_x0020_Code xmlns="e36bfbf9-5e42-489c-a259-4c54eb22cb57">WIN-B363</Session_x0020_Code>
+    <Presentation_x0020_Date xmlns="e36bfbf9-5e42-489c-a259-4c54eb22cb57">2014-05-13T18:00:00-05:00</Presentation_x0020_Date>
+    <MS_x0020_Content_x0020_Owner xmlns="e36bfbf9-5e42-489c-a259-4c54eb22cb57">
+      <UserInfo>
+        <DisplayName/>
+        <AccountId xsi:nil="true"/>
+        <AccountType/>
+      </UserInfo>
+    </MS_x0020_Content_x0020_Owner>
+    <o359a72c0e394a2bbc3ef6c803acc180 xmlns="e36bfbf9-5e42-489c-a259-4c54eb22cb57">
+      <Terms xmlns="http://schemas.microsoft.com/office/infopath/2007/PartnerControls">
+        <TermInfo xmlns="http://schemas.microsoft.com/office/infopath/2007/PartnerControls">
+          <TermName xmlns="http://schemas.microsoft.com/office/infopath/2007/PartnerControls">George R. Brown Convention Center</TermName>
+          <TermId xmlns="http://schemas.microsoft.com/office/infopath/2007/PartnerControls">6c33c07d-d6c4-4c5e-b5d0-7afd8a7a4e7d</TermId>
+        </TermInfo>
+      </Terms>
+    </o359a72c0e394a2bbc3ef6c803acc180>
+    <o05f84fa51b8493184c53e88c1048d4a xmlns="e36bfbf9-5e42-489c-a259-4c54eb22cb57">
+      <Terms xmlns="http://schemas.microsoft.com/office/infopath/2007/PartnerControls"/>
+    </o05f84fa51b8493184c53e88c1048d4a>
+    <g9dd8d57dc62470db6c80d9bb76f6f98 xmlns="e36bfbf9-5e42-489c-a259-4c54eb22cb57">
+      <Terms xmlns="http://schemas.microsoft.com/office/infopath/2007/PartnerControls"/>
+    </g9dd8d57dc62470db6c80d9bb76f6f98>
+    <ha6fe286c6b34f98b7bef39f1ccb86a0 xmlns="e36bfbf9-5e42-489c-a259-4c54eb22cb57">
+      <Terms xmlns="http://schemas.microsoft.com/office/infopath/2007/PartnerControls"/>
+    </ha6fe286c6b34f98b7bef39f1ccb86a0>
+    <o915802bd8fb417bbe5f6f423fd076a0 xmlns="e36bfbf9-5e42-489c-a259-4c54eb22cb57">
+      <Terms xmlns="http://schemas.microsoft.com/office/infopath/2007/PartnerControls">
+        <TermInfo xmlns="http://schemas.microsoft.com/office/infopath/2007/PartnerControls">
+          <TermName xmlns="http://schemas.microsoft.com/office/infopath/2007/PartnerControls">developers</TermName>
+          <TermId xmlns="http://schemas.microsoft.com/office/infopath/2007/PartnerControls">8e4a08dc-5d95-4156-ab65-f22579a1592a</TermId>
+        </TermInfo>
+      </Terms>
+    </o915802bd8fb417bbe5f6f423fd076a0>
+    <i23d7ba649194ae1bace8707520bbe5b xmlns="e36bfbf9-5e42-489c-a259-4c54eb22cb57">
+      <Terms xmlns="http://schemas.microsoft.com/office/infopath/2007/PartnerControls">
+        <TermInfo xmlns="http://schemas.microsoft.com/office/infopath/2007/PartnerControls">
+          <TermName xmlns="http://schemas.microsoft.com/office/infopath/2007/PartnerControls">Microsoft Tech Ed</TermName>
+          <TermId xmlns="http://schemas.microsoft.com/office/infopath/2007/PartnerControls">30c8c6b6-2916-412b-8e18-b132d138380c</TermId>
+        </TermInfo>
+      </Terms>
+    </i23d7ba649194ae1bace8707520bbe5b>
+    <l3c4e8b902d24cac82560b32d42c7cb4 xmlns="e36bfbf9-5e42-489c-a259-4c54eb22cb57">
+      <Terms xmlns="http://schemas.microsoft.com/office/infopath/2007/PartnerControls">
+        <TermInfo xmlns="http://schemas.microsoft.com/office/infopath/2007/PartnerControls">
+          <TermName xmlns="http://schemas.microsoft.com/office/infopath/2007/PartnerControls">Houston</TermName>
+          <TermId xmlns="http://schemas.microsoft.com/office/infopath/2007/PartnerControls">b97448fd-4b6d-4055-9328-60bf1c4ceb26</TermId>
+        </TermInfo>
+      </Terms>
+    </l3c4e8b902d24cac82560b32d42c7cb4>
+    <LikesCount xmlns="http://schemas.microsoft.com/sharepoint/v3" xsi:nil="true"/>
+    <Ratings xmlns="http://schemas.microsoft.com/sharepoint/v3" xsi:nil="true"/>
+    <LikedBy xmlns="http://schemas.microsoft.com/sharepoint/v3">
+      <UserInfo>
+        <DisplayName/>
+        <AccountId xsi:nil="true"/>
+        <AccountType/>
+      </UserInfo>
+    </LikedBy>
+    <TaxKeywordTaxHTField xmlns="230e9df3-be65-4c73-a93b-d1236ebd677e">
+      <Terms xmlns="http://schemas.microsoft.com/office/infopath/2007/PartnerControls"/>
+    </TaxKeywordTaxHTField>
+    <RatedBy xmlns="http://schemas.microsoft.com/sharepoint/v3">
+      <UserInfo>
+        <DisplayName/>
+        <AccountId xsi:nil="true"/>
+        <AccountType/>
+      </UserInfo>
+    </RatedBy>
+  </documentManagement>
+</p:properties>
+</file>
+
+<file path=customXml/item3.xml><?xml version="1.0" encoding="utf-8"?>
+<?mso-contentType ?>
+<FormTemplates xmlns="http://schemas.microsoft.com/sharepoint/v3/contenttype/forms">
+  <Display>DocumentLibraryForm</Display>
+  <Edit>DocumentLibraryForm</Edit>
+  <New>DocumentLibraryForm</New>
+</FormTemplates>
+</file>
+
 <file path=customXml/itemProps1.xml><?xml version="1.0" encoding="utf-8"?>
-<ds:datastoreItem xmlns:ds="http://schemas.openxmlformats.org/officeDocument/2006/customXml" ds:itemID="{758FDAC0-319D-4A54-8D8E-1D42CB1F8004}">
+<ds:datastoreItem xmlns:ds="http://schemas.openxmlformats.org/officeDocument/2006/customXml" ds:itemID="{5D89E042-4A0F-4D22-AC9C-BB5B833EE55C}">
   <ds:schemaRefs>
-    <ds:schemaRef ds:uri="http://schemas.microsoft.com/sharepoint/v3/contenttype/forms"/>
+    <ds:schemaRef ds:uri="http://schemas.microsoft.com/office/2006/metadata/contentType"/>
+    <ds:schemaRef ds:uri="http://schemas.microsoft.com/office/2006/metadata/properties/metaAttributes"/>
+    <ds:schemaRef ds:uri="http://www.w3.org/2001/XMLSchema"/>
+    <ds:schemaRef ds:uri="http://schemas.microsoft.com/office/2006/metadata/properties"/>
+    <ds:schemaRef ds:uri="http://schemas.microsoft.com/sharepoint/v3"/>
+    <ds:schemaRef ds:uri="e36bfbf9-5e42-489c-a259-4c54eb22cb57"/>
+    <ds:schemaRef ds:uri="230e9df3-be65-4c73-a93b-d1236ebd677e"/>
+    <ds:schemaRef ds:uri="http://schemas.microsoft.com/office/2006/documentManagement/types"/>
+    <ds:schemaRef ds:uri="http://schemas.microsoft.com/office/infopath/2007/PartnerControls"/>
+    <ds:schemaRef ds:uri="http://schemas.openxmlformats.org/package/2006/metadata/core-properties"/>
+    <ds:schemaRef ds:uri="http://purl.org/dc/elements/1.1/"/>
+    <ds:schemaRef ds:uri="http://purl.org/dc/terms/"/>
+    <ds:schemaRef ds:uri="http://schemas.microsoft.com/internal/obd"/>
   </ds:schemaRefs>
 </ds:datastoreItem>
 </file>
@@ -10135,21 +10147,9 @@
 </file>
 
 <file path=customXml/itemProps3.xml><?xml version="1.0" encoding="utf-8"?>
-<ds:datastoreItem xmlns:ds="http://schemas.openxmlformats.org/officeDocument/2006/customXml" ds:itemID="{5D89E042-4A0F-4D22-AC9C-BB5B833EE55C}">
+<ds:datastoreItem xmlns:ds="http://schemas.openxmlformats.org/officeDocument/2006/customXml" ds:itemID="{758FDAC0-319D-4A54-8D8E-1D42CB1F8004}">
   <ds:schemaRefs>
-    <ds:schemaRef ds:uri="http://schemas.microsoft.com/office/2006/metadata/contentType"/>
-    <ds:schemaRef ds:uri="http://schemas.microsoft.com/office/2006/metadata/properties/metaAttributes"/>
-    <ds:schemaRef ds:uri="http://www.w3.org/2001/XMLSchema"/>
-    <ds:schemaRef ds:uri="http://schemas.microsoft.com/office/2006/metadata/properties"/>
-    <ds:schemaRef ds:uri="http://schemas.microsoft.com/sharepoint/v3"/>
-    <ds:schemaRef ds:uri="e36bfbf9-5e42-489c-a259-4c54eb22cb57"/>
-    <ds:schemaRef ds:uri="230e9df3-be65-4c73-a93b-d1236ebd677e"/>
-    <ds:schemaRef ds:uri="http://schemas.microsoft.com/office/2006/documentManagement/types"/>
-    <ds:schemaRef ds:uri="http://schemas.microsoft.com/office/infopath/2007/PartnerControls"/>
-    <ds:schemaRef ds:uri="http://schemas.openxmlformats.org/package/2006/metadata/core-properties"/>
-    <ds:schemaRef ds:uri="http://purl.org/dc/elements/1.1/"/>
-    <ds:schemaRef ds:uri="http://purl.org/dc/terms/"/>
-    <ds:schemaRef ds:uri="http://schemas.microsoft.com/internal/obd"/>
+    <ds:schemaRef ds:uri="http://schemas.microsoft.com/sharepoint/v3/contenttype/forms"/>
   </ds:schemaRefs>
 </ds:datastoreItem>
 </file>
</xml_diff>